<commit_message>
Actividad Obligatoria con cambios
</commit_message>
<xml_diff>
--- a/Actividades Obligatorias/ACTIVIDAD-OBLIGATORIA1.pptx
+++ b/Actividades Obligatorias/ACTIVIDAD-OBLIGATORIA1.pptx
@@ -280,6 +280,211 @@
     </p:ext>
   </p:extLst>
 </p:presentation>
+</file>
+
+<file path=ppt/changesInfos/changesInfo1.xml><?xml version="1.0" encoding="utf-8"?>
+<pc:chgInfo xmlns:a="http://schemas.openxmlformats.org/drawingml/2006/main" xmlns:r="http://schemas.openxmlformats.org/officeDocument/2006/relationships" xmlns:ac="http://schemas.microsoft.com/office/drawing/2013/main/command" xmlns:pc="http://schemas.microsoft.com/office/powerpoint/2013/main/command">
+  <pc:docChgLst>
+    <pc:chgData name="Katerine LLano" userId="cb1fdfc2d7e98dbe" providerId="LiveId" clId="{08E747F1-EDC5-41DC-A251-BAB27EA25BD0}"/>
+    <pc:docChg chg="undo custSel modSld">
+      <pc:chgData name="Katerine LLano" userId="cb1fdfc2d7e98dbe" providerId="LiveId" clId="{08E747F1-EDC5-41DC-A251-BAB27EA25BD0}" dt="2022-08-26T01:29:06.173" v="123" actId="20577"/>
+      <pc:docMkLst>
+        <pc:docMk/>
+      </pc:docMkLst>
+      <pc:sldChg chg="modSp mod">
+        <pc:chgData name="Katerine LLano" userId="cb1fdfc2d7e98dbe" providerId="LiveId" clId="{08E747F1-EDC5-41DC-A251-BAB27EA25BD0}" dt="2022-08-26T01:26:04.759" v="113"/>
+        <pc:sldMkLst>
+          <pc:docMk/>
+          <pc:sldMk cId="0" sldId="265"/>
+        </pc:sldMkLst>
+        <pc:spChg chg="mod">
+          <ac:chgData name="Katerine LLano" userId="cb1fdfc2d7e98dbe" providerId="LiveId" clId="{08E747F1-EDC5-41DC-A251-BAB27EA25BD0}" dt="2022-08-26T01:18:33.624" v="26" actId="20577"/>
+          <ac:spMkLst>
+            <pc:docMk/>
+            <pc:sldMk cId="0" sldId="265"/>
+            <ac:spMk id="153" creationId="{00000000-0000-0000-0000-000000000000}"/>
+          </ac:spMkLst>
+        </pc:spChg>
+        <pc:graphicFrameChg chg="mod modGraphic">
+          <ac:chgData name="Katerine LLano" userId="cb1fdfc2d7e98dbe" providerId="LiveId" clId="{08E747F1-EDC5-41DC-A251-BAB27EA25BD0}" dt="2022-08-26T01:26:04.759" v="113"/>
+          <ac:graphicFrameMkLst>
+            <pc:docMk/>
+            <pc:sldMk cId="0" sldId="265"/>
+            <ac:graphicFrameMk id="156" creationId="{00000000-0000-0000-0000-000000000000}"/>
+          </ac:graphicFrameMkLst>
+        </pc:graphicFrameChg>
+      </pc:sldChg>
+      <pc:sldChg chg="modSp mod">
+        <pc:chgData name="Katerine LLano" userId="cb1fdfc2d7e98dbe" providerId="LiveId" clId="{08E747F1-EDC5-41DC-A251-BAB27EA25BD0}" dt="2022-08-26T01:26:09.817" v="114"/>
+        <pc:sldMkLst>
+          <pc:docMk/>
+          <pc:sldMk cId="0" sldId="266"/>
+        </pc:sldMkLst>
+        <pc:spChg chg="mod">
+          <ac:chgData name="Katerine LLano" userId="cb1fdfc2d7e98dbe" providerId="LiveId" clId="{08E747F1-EDC5-41DC-A251-BAB27EA25BD0}" dt="2022-08-26T01:18:39.691" v="27" actId="20577"/>
+          <ac:spMkLst>
+            <pc:docMk/>
+            <pc:sldMk cId="0" sldId="266"/>
+            <ac:spMk id="161" creationId="{00000000-0000-0000-0000-000000000000}"/>
+          </ac:spMkLst>
+        </pc:spChg>
+        <pc:graphicFrameChg chg="mod modGraphic">
+          <ac:chgData name="Katerine LLano" userId="cb1fdfc2d7e98dbe" providerId="LiveId" clId="{08E747F1-EDC5-41DC-A251-BAB27EA25BD0}" dt="2022-08-26T01:26:09.817" v="114"/>
+          <ac:graphicFrameMkLst>
+            <pc:docMk/>
+            <pc:sldMk cId="0" sldId="266"/>
+            <ac:graphicFrameMk id="163" creationId="{00000000-0000-0000-0000-000000000000}"/>
+          </ac:graphicFrameMkLst>
+        </pc:graphicFrameChg>
+      </pc:sldChg>
+      <pc:sldChg chg="modSp mod">
+        <pc:chgData name="Katerine LLano" userId="cb1fdfc2d7e98dbe" providerId="LiveId" clId="{08E747F1-EDC5-41DC-A251-BAB27EA25BD0}" dt="2022-08-26T01:26:13.966" v="115"/>
+        <pc:sldMkLst>
+          <pc:docMk/>
+          <pc:sldMk cId="0" sldId="267"/>
+        </pc:sldMkLst>
+        <pc:graphicFrameChg chg="mod modGraphic">
+          <ac:chgData name="Katerine LLano" userId="cb1fdfc2d7e98dbe" providerId="LiveId" clId="{08E747F1-EDC5-41DC-A251-BAB27EA25BD0}" dt="2022-08-26T01:26:13.966" v="115"/>
+          <ac:graphicFrameMkLst>
+            <pc:docMk/>
+            <pc:sldMk cId="0" sldId="267"/>
+            <ac:graphicFrameMk id="171" creationId="{00000000-0000-0000-0000-000000000000}"/>
+          </ac:graphicFrameMkLst>
+        </pc:graphicFrameChg>
+      </pc:sldChg>
+      <pc:sldChg chg="modSp mod">
+        <pc:chgData name="Katerine LLano" userId="cb1fdfc2d7e98dbe" providerId="LiveId" clId="{08E747F1-EDC5-41DC-A251-BAB27EA25BD0}" dt="2022-08-26T01:26:17.711" v="116"/>
+        <pc:sldMkLst>
+          <pc:docMk/>
+          <pc:sldMk cId="0" sldId="269"/>
+        </pc:sldMkLst>
+        <pc:spChg chg="mod">
+          <ac:chgData name="Katerine LLano" userId="cb1fdfc2d7e98dbe" providerId="LiveId" clId="{08E747F1-EDC5-41DC-A251-BAB27EA25BD0}" dt="2022-08-26T01:18:46.828" v="28" actId="20577"/>
+          <ac:spMkLst>
+            <pc:docMk/>
+            <pc:sldMk cId="0" sldId="269"/>
+            <ac:spMk id="184" creationId="{00000000-0000-0000-0000-000000000000}"/>
+          </ac:spMkLst>
+        </pc:spChg>
+        <pc:graphicFrameChg chg="mod modGraphic">
+          <ac:chgData name="Katerine LLano" userId="cb1fdfc2d7e98dbe" providerId="LiveId" clId="{08E747F1-EDC5-41DC-A251-BAB27EA25BD0}" dt="2022-08-26T01:26:17.711" v="116"/>
+          <ac:graphicFrameMkLst>
+            <pc:docMk/>
+            <pc:sldMk cId="0" sldId="269"/>
+            <ac:graphicFrameMk id="187" creationId="{00000000-0000-0000-0000-000000000000}"/>
+          </ac:graphicFrameMkLst>
+        </pc:graphicFrameChg>
+      </pc:sldChg>
+      <pc:sldChg chg="modSp mod">
+        <pc:chgData name="Katerine LLano" userId="cb1fdfc2d7e98dbe" providerId="LiveId" clId="{08E747F1-EDC5-41DC-A251-BAB27EA25BD0}" dt="2022-08-26T01:26:21.515" v="117"/>
+        <pc:sldMkLst>
+          <pc:docMk/>
+          <pc:sldMk cId="0" sldId="270"/>
+        </pc:sldMkLst>
+        <pc:spChg chg="mod">
+          <ac:chgData name="Katerine LLano" userId="cb1fdfc2d7e98dbe" providerId="LiveId" clId="{08E747F1-EDC5-41DC-A251-BAB27EA25BD0}" dt="2022-08-26T01:18:51.025" v="29" actId="20577"/>
+          <ac:spMkLst>
+            <pc:docMk/>
+            <pc:sldMk cId="0" sldId="270"/>
+            <ac:spMk id="192" creationId="{00000000-0000-0000-0000-000000000000}"/>
+          </ac:spMkLst>
+        </pc:spChg>
+        <pc:graphicFrameChg chg="mod modGraphic">
+          <ac:chgData name="Katerine LLano" userId="cb1fdfc2d7e98dbe" providerId="LiveId" clId="{08E747F1-EDC5-41DC-A251-BAB27EA25BD0}" dt="2022-08-26T01:26:21.515" v="117"/>
+          <ac:graphicFrameMkLst>
+            <pc:docMk/>
+            <pc:sldMk cId="0" sldId="270"/>
+            <ac:graphicFrameMk id="195" creationId="{00000000-0000-0000-0000-000000000000}"/>
+          </ac:graphicFrameMkLst>
+        </pc:graphicFrameChg>
+      </pc:sldChg>
+      <pc:sldChg chg="delSp modSp mod">
+        <pc:chgData name="Katerine LLano" userId="cb1fdfc2d7e98dbe" providerId="LiveId" clId="{08E747F1-EDC5-41DC-A251-BAB27EA25BD0}" dt="2022-08-26T01:26:25.857" v="118"/>
+        <pc:sldMkLst>
+          <pc:docMk/>
+          <pc:sldMk cId="0" sldId="271"/>
+        </pc:sldMkLst>
+        <pc:spChg chg="del mod">
+          <ac:chgData name="Katerine LLano" userId="cb1fdfc2d7e98dbe" providerId="LiveId" clId="{08E747F1-EDC5-41DC-A251-BAB27EA25BD0}" dt="2022-08-26T01:12:04.438" v="15" actId="478"/>
+          <ac:spMkLst>
+            <pc:docMk/>
+            <pc:sldMk cId="0" sldId="271"/>
+            <ac:spMk id="203" creationId="{00000000-0000-0000-0000-000000000000}"/>
+          </ac:spMkLst>
+        </pc:spChg>
+        <pc:graphicFrameChg chg="mod">
+          <ac:chgData name="Katerine LLano" userId="cb1fdfc2d7e98dbe" providerId="LiveId" clId="{08E747F1-EDC5-41DC-A251-BAB27EA25BD0}" dt="2022-08-26T01:26:25.857" v="118"/>
+          <ac:graphicFrameMkLst>
+            <pc:docMk/>
+            <pc:sldMk cId="0" sldId="271"/>
+            <ac:graphicFrameMk id="202" creationId="{00000000-0000-0000-0000-000000000000}"/>
+          </ac:graphicFrameMkLst>
+        </pc:graphicFrameChg>
+      </pc:sldChg>
+      <pc:sldChg chg="modSp mod">
+        <pc:chgData name="Katerine LLano" userId="cb1fdfc2d7e98dbe" providerId="LiveId" clId="{08E747F1-EDC5-41DC-A251-BAB27EA25BD0}" dt="2022-08-26T01:26:32.823" v="119"/>
+        <pc:sldMkLst>
+          <pc:docMk/>
+          <pc:sldMk cId="0" sldId="273"/>
+        </pc:sldMkLst>
+        <pc:spChg chg="mod">
+          <ac:chgData name="Katerine LLano" userId="cb1fdfc2d7e98dbe" providerId="LiveId" clId="{08E747F1-EDC5-41DC-A251-BAB27EA25BD0}" dt="2022-08-26T01:18:57.722" v="30" actId="20577"/>
+          <ac:spMkLst>
+            <pc:docMk/>
+            <pc:sldMk cId="0" sldId="273"/>
+            <ac:spMk id="215" creationId="{00000000-0000-0000-0000-000000000000}"/>
+          </ac:spMkLst>
+        </pc:spChg>
+        <pc:graphicFrameChg chg="mod modGraphic">
+          <ac:chgData name="Katerine LLano" userId="cb1fdfc2d7e98dbe" providerId="LiveId" clId="{08E747F1-EDC5-41DC-A251-BAB27EA25BD0}" dt="2022-08-26T01:26:32.823" v="119"/>
+          <ac:graphicFrameMkLst>
+            <pc:docMk/>
+            <pc:sldMk cId="0" sldId="273"/>
+            <ac:graphicFrameMk id="218" creationId="{00000000-0000-0000-0000-000000000000}"/>
+          </ac:graphicFrameMkLst>
+        </pc:graphicFrameChg>
+      </pc:sldChg>
+      <pc:sldChg chg="modSp mod">
+        <pc:chgData name="Katerine LLano" userId="cb1fdfc2d7e98dbe" providerId="LiveId" clId="{08E747F1-EDC5-41DC-A251-BAB27EA25BD0}" dt="2022-08-26T01:26:36.387" v="120"/>
+        <pc:sldMkLst>
+          <pc:docMk/>
+          <pc:sldMk cId="0" sldId="274"/>
+        </pc:sldMkLst>
+        <pc:spChg chg="mod">
+          <ac:chgData name="Katerine LLano" userId="cb1fdfc2d7e98dbe" providerId="LiveId" clId="{08E747F1-EDC5-41DC-A251-BAB27EA25BD0}" dt="2022-08-26T01:19:01.873" v="31" actId="20577"/>
+          <ac:spMkLst>
+            <pc:docMk/>
+            <pc:sldMk cId="0" sldId="274"/>
+            <ac:spMk id="223" creationId="{00000000-0000-0000-0000-000000000000}"/>
+          </ac:spMkLst>
+        </pc:spChg>
+        <pc:graphicFrameChg chg="mod modGraphic">
+          <ac:chgData name="Katerine LLano" userId="cb1fdfc2d7e98dbe" providerId="LiveId" clId="{08E747F1-EDC5-41DC-A251-BAB27EA25BD0}" dt="2022-08-26T01:26:36.387" v="120"/>
+          <ac:graphicFrameMkLst>
+            <pc:docMk/>
+            <pc:sldMk cId="0" sldId="274"/>
+            <ac:graphicFrameMk id="226" creationId="{00000000-0000-0000-0000-000000000000}"/>
+          </ac:graphicFrameMkLst>
+        </pc:graphicFrameChg>
+      </pc:sldChg>
+      <pc:sldChg chg="modSp mod">
+        <pc:chgData name="Katerine LLano" userId="cb1fdfc2d7e98dbe" providerId="LiveId" clId="{08E747F1-EDC5-41DC-A251-BAB27EA25BD0}" dt="2022-08-26T01:29:06.173" v="123" actId="20577"/>
+        <pc:sldMkLst>
+          <pc:docMk/>
+          <pc:sldMk cId="0" sldId="275"/>
+        </pc:sldMkLst>
+        <pc:graphicFrameChg chg="mod modGraphic">
+          <ac:chgData name="Katerine LLano" userId="cb1fdfc2d7e98dbe" providerId="LiveId" clId="{08E747F1-EDC5-41DC-A251-BAB27EA25BD0}" dt="2022-08-26T01:29:06.173" v="123" actId="20577"/>
+          <ac:graphicFrameMkLst>
+            <pc:docMk/>
+            <pc:sldMk cId="0" sldId="275"/>
+            <ac:graphicFrameMk id="234" creationId="{00000000-0000-0000-0000-000000000000}"/>
+          </ac:graphicFrameMkLst>
+        </pc:graphicFrameChg>
+      </pc:sldChg>
+    </pc:docChg>
+  </pc:docChgLst>
+</pc:chgInfo>
 </file>
 
 <file path=ppt/notesMasters/notesMaster1.xml><?xml version="1.0" encoding="utf-8"?>
@@ -5251,7 +5456,7 @@
               <a:buNone/>
             </a:pPr>
             <a:r>
-              <a:rPr lang="es" sz="3000" b="1">
+              <a:rPr lang="es" sz="3000" b="1" dirty="0">
                 <a:solidFill>
                   <a:srgbClr val="EC183F"/>
                 </a:solidFill>
@@ -5260,9 +5465,9 @@
                 <a:cs typeface="Rajdhani"/>
                 <a:sym typeface="Rajdhani"/>
               </a:rPr>
-              <a:t>Gama baja - Intel</a:t>
+              <a:t>Gama baja</a:t>
             </a:r>
-            <a:endParaRPr sz="3000" b="1">
+            <a:endParaRPr sz="3000" b="1" dirty="0">
               <a:solidFill>
                 <a:srgbClr val="EC183F"/>
               </a:solidFill>
@@ -5368,7 +5573,7 @@
           <p:nvPr>
             <p:extLst>
               <p:ext uri="{D42A27DB-BD31-4B8C-83A1-F6EECF244321}">
-                <p14:modId xmlns:p14="http://schemas.microsoft.com/office/powerpoint/2010/main" val="3159191768"/>
+                <p14:modId xmlns:p14="http://schemas.microsoft.com/office/powerpoint/2010/main" val="904928583"/>
               </p:ext>
             </p:extLst>
           </p:nvPr>
@@ -5453,20 +5658,14 @@
                         <a:buNone/>
                       </a:pPr>
                       <a:r>
-                        <a:rPr lang="es">
+                        <a:rPr lang="es-CO" dirty="0">
                           <a:latin typeface="Open Sans"/>
                           <a:ea typeface="Open Sans"/>
                           <a:cs typeface="Open Sans"/>
                           <a:sym typeface="Open Sans"/>
                         </a:rPr>
-                        <a:t>Core i3 7100</a:t>
+                        <a:t>CORE I3 7100</a:t>
                       </a:r>
-                      <a:endParaRPr>
-                        <a:latin typeface="Open Sans"/>
-                        <a:ea typeface="Open Sans"/>
-                        <a:cs typeface="Open Sans"/>
-                        <a:sym typeface="Open Sans"/>
-                      </a:endParaRPr>
                     </a:p>
                   </a:txBody>
                   <a:tcPr marL="91425" marR="91425" marT="91425" marB="91425">
@@ -5616,9 +5815,10 @@
                         <a:defRPr/>
                       </a:pPr>
                       <a:r>
-                        <a:rPr lang="es-MX" dirty="0"/>
-                        <a:t>DDR4 DIMM sockets hasta 64gb de memoria</a:t>
+                        <a:rPr lang="es-CO" dirty="0"/>
+                        <a:t>8GB DDR3</a:t>
                       </a:r>
+                      <a:endParaRPr lang="es-MX" dirty="0"/>
                     </a:p>
                   </a:txBody>
                   <a:tcPr marL="91425" marR="91425" marT="91425" marB="91425">
@@ -5772,7 +5972,7 @@
               <a:buNone/>
             </a:pPr>
             <a:r>
-              <a:rPr lang="es" sz="3000" b="1">
+              <a:rPr lang="es" sz="3000" b="1" dirty="0">
                 <a:solidFill>
                   <a:srgbClr val="EC183F"/>
                 </a:solidFill>
@@ -5781,9 +5981,9 @@
                 <a:cs typeface="Rajdhani"/>
                 <a:sym typeface="Rajdhani"/>
               </a:rPr>
-              <a:t>Gama baja - AMD</a:t>
+              <a:t>Gama baja</a:t>
             </a:r>
-            <a:endParaRPr sz="3000" b="1">
+            <a:endParaRPr sz="3000" b="1" dirty="0">
               <a:solidFill>
                 <a:srgbClr val="EC183F"/>
               </a:solidFill>
@@ -5851,7 +6051,7 @@
           <p:nvPr>
             <p:extLst>
               <p:ext uri="{D42A27DB-BD31-4B8C-83A1-F6EECF244321}">
-                <p14:modId xmlns:p14="http://schemas.microsoft.com/office/powerpoint/2010/main" val="671969576"/>
+                <p14:modId xmlns:p14="http://schemas.microsoft.com/office/powerpoint/2010/main" val="1255602733"/>
               </p:ext>
             </p:extLst>
           </p:nvPr>
@@ -5936,20 +6136,14 @@
                         <a:buNone/>
                       </a:pPr>
                       <a:r>
-                        <a:rPr lang="es">
+                        <a:rPr lang="es-CO" dirty="0">
                           <a:latin typeface="Open Sans"/>
                           <a:ea typeface="Open Sans"/>
                           <a:cs typeface="Open Sans"/>
                           <a:sym typeface="Open Sans"/>
                         </a:rPr>
-                        <a:t>Ryzen 3 2200g</a:t>
+                        <a:t>RYZEN 3 2200G</a:t>
                       </a:r>
-                      <a:endParaRPr>
-                        <a:latin typeface="Open Sans"/>
-                        <a:ea typeface="Open Sans"/>
-                        <a:cs typeface="Open Sans"/>
-                        <a:sym typeface="Open Sans"/>
-                      </a:endParaRPr>
                     </a:p>
                   </a:txBody>
                   <a:tcPr marL="91425" marR="91425" marT="91425" marB="91425">
@@ -6029,7 +6223,7 @@
                           <a:cs typeface="Open Sans"/>
                           <a:sym typeface="Open Sans"/>
                         </a:rPr>
-                        <a:t>MSI ProSeries B450-A Pro Max</a:t>
+                        <a:t>MSI PROSERIES B450-A PRO MAX</a:t>
                       </a:r>
                     </a:p>
                   </a:txBody>
@@ -6104,9 +6298,9 @@
                           <a:cs typeface="Arial"/>
                           <a:sym typeface="Arial"/>
                         </a:rPr>
-                        <a:t>8GB DDR4 3000MHZ</a:t>
+                        <a:t>4GB DDR4</a:t>
                       </a:r>
-                      <a:endParaRPr dirty="0">
+                      <a:endParaRPr lang="es-CO" dirty="0">
                         <a:latin typeface="Open Sans"/>
                         <a:ea typeface="Open Sans"/>
                         <a:cs typeface="Open Sans"/>
@@ -6185,9 +6379,9 @@
                           <a:cs typeface="Arial"/>
                           <a:sym typeface="Arial"/>
                         </a:rPr>
-                        <a:t>HDD 750GB </a:t>
+                        <a:t>HDD 500GB </a:t>
                       </a:r>
-                      <a:endParaRPr dirty="0">
+                      <a:endParaRPr lang="es-CO" dirty="0">
                         <a:latin typeface="Open Sans"/>
                         <a:ea typeface="Open Sans"/>
                         <a:cs typeface="Open Sans"/>
@@ -6387,7 +6581,7 @@
           <p:nvPr>
             <p:extLst>
               <p:ext uri="{D42A27DB-BD31-4B8C-83A1-F6EECF244321}">
-                <p14:modId xmlns:p14="http://schemas.microsoft.com/office/powerpoint/2010/main" val="962131983"/>
+                <p14:modId xmlns:p14="http://schemas.microsoft.com/office/powerpoint/2010/main" val="2027362428"/>
               </p:ext>
             </p:extLst>
           </p:nvPr>
@@ -6482,9 +6676,9 @@
                           <a:cs typeface="Arial"/>
                           <a:sym typeface="Arial"/>
                         </a:rPr>
-                        <a:t>Core i3 7100</a:t>
+                        <a:t>CORE I3 7100</a:t>
                       </a:r>
-                      <a:endParaRPr dirty="0">
+                      <a:endParaRPr lang="es-CO" dirty="0">
                         <a:latin typeface="Open Sans"/>
                         <a:ea typeface="Open Sans"/>
                         <a:cs typeface="Open Sans"/>
@@ -6504,7 +6698,7 @@
                   </a:ext>
                 </a:extLst>
               </a:tr>
-              <a:tr h="381000">
+              <a:tr h="374393">
                 <a:tc>
                   <a:txBody>
                     <a:bodyPr/>
@@ -6565,7 +6759,7 @@
                         </a:rPr>
                         <a:t>CHIPSET H110</a:t>
                       </a:r>
-                      <a:endParaRPr dirty="0">
+                      <a:endParaRPr lang="es-CO" dirty="0">
                         <a:latin typeface="Open Sans"/>
                         <a:ea typeface="Open Sans"/>
                         <a:cs typeface="Open Sans"/>
@@ -6639,7 +6833,7 @@
                           <a:ea typeface="Calibri" panose="020F0502020204030204" pitchFamily="34" charset="0"/>
                           <a:cs typeface="Times New Roman" panose="02020603050405020304" pitchFamily="18" charset="0"/>
                         </a:rPr>
-                        <a:t>8GB DDR4 3000 MHZ</a:t>
+                        <a:t>8GB DDR4</a:t>
                       </a:r>
                     </a:p>
                   </a:txBody>
@@ -6849,7 +7043,7 @@
               <a:buNone/>
             </a:pPr>
             <a:r>
-              <a:rPr lang="es" sz="3000" b="1">
+              <a:rPr lang="es" sz="3000" b="1" dirty="0">
                 <a:solidFill>
                   <a:srgbClr val="EC183F"/>
                 </a:solidFill>
@@ -6858,9 +7052,9 @@
                 <a:cs typeface="Rajdhani"/>
                 <a:sym typeface="Rajdhani"/>
               </a:rPr>
-              <a:t>Gama media - Intel</a:t>
+              <a:t>Gama media</a:t>
             </a:r>
-            <a:endParaRPr sz="3000" b="1">
+            <a:endParaRPr sz="3000" b="1" dirty="0">
               <a:solidFill>
                 <a:srgbClr val="EC183F"/>
               </a:solidFill>
@@ -6966,7 +7160,7 @@
           <p:nvPr>
             <p:extLst>
               <p:ext uri="{D42A27DB-BD31-4B8C-83A1-F6EECF244321}">
-                <p14:modId xmlns:p14="http://schemas.microsoft.com/office/powerpoint/2010/main" val="3264490092"/>
+                <p14:modId xmlns:p14="http://schemas.microsoft.com/office/powerpoint/2010/main" val="315017658"/>
               </p:ext>
             </p:extLst>
           </p:nvPr>
@@ -7057,7 +7251,7 @@
                           <a:cs typeface="Open Sans"/>
                           <a:sym typeface="Open Sans"/>
                         </a:rPr>
-                        <a:t>Ryzen </a:t>
+                        <a:t>RYZEN </a:t>
                       </a:r>
                       <a:r>
                         <a:rPr lang="es-CO" sz="1400" b="0" i="0" u="none" strike="noStrike" cap="none" dirty="0">
@@ -7072,7 +7266,7 @@
                         </a:rPr>
                         <a:t>5 5600X</a:t>
                       </a:r>
-                      <a:endParaRPr dirty="0">
+                      <a:endParaRPr lang="es-CO" dirty="0">
                         <a:latin typeface="Open Sans"/>
                         <a:ea typeface="Open Sans"/>
                         <a:cs typeface="Open Sans"/>
@@ -7147,14 +7341,8 @@
                           <a:cs typeface="Open Sans"/>
                           <a:sym typeface="Open Sans"/>
                         </a:rPr>
-                        <a:t>PCI-Express 3.0</a:t>
+                        <a:t>PCI-EXPRESS 3.0</a:t>
                       </a:r>
-                      <a:endParaRPr dirty="0">
-                        <a:latin typeface="Open Sans"/>
-                        <a:ea typeface="Open Sans"/>
-                        <a:cs typeface="Open Sans"/>
-                        <a:sym typeface="Open Sans"/>
-                      </a:endParaRPr>
                     </a:p>
                   </a:txBody>
                   <a:tcPr marL="91425" marR="91425" marT="91425" marB="91425"/>
@@ -7228,9 +7416,9 @@
                           <a:cs typeface="Arial"/>
                           <a:sym typeface="Arial"/>
                         </a:rPr>
-                        <a:t>16GB DDR4 3200MHZ</a:t>
+                        <a:t>16GB DDR4</a:t>
                       </a:r>
-                      <a:endParaRPr dirty="0">
+                      <a:endParaRPr lang="es-CO" dirty="0">
                         <a:latin typeface="Open Sans"/>
                         <a:ea typeface="Open Sans"/>
                         <a:cs typeface="Open Sans"/>
@@ -7305,14 +7493,8 @@
                           <a:cs typeface="Open Sans"/>
                           <a:sym typeface="Open Sans"/>
                         </a:rPr>
-                        <a:t>500 GB SSD</a:t>
+                        <a:t>500GB SSD</a:t>
                       </a:r>
-                      <a:endParaRPr dirty="0">
-                        <a:latin typeface="Open Sans"/>
-                        <a:ea typeface="Open Sans"/>
-                        <a:cs typeface="Open Sans"/>
-                        <a:sym typeface="Open Sans"/>
-                      </a:endParaRPr>
                     </a:p>
                   </a:txBody>
                   <a:tcPr marL="91425" marR="91425" marT="91425" marB="91425"/>
@@ -7376,20 +7558,14 @@
                         <a:buNone/>
                       </a:pPr>
                       <a:r>
-                        <a:rPr lang="es" dirty="0">
+                        <a:rPr lang="en-US" dirty="0">
                           <a:latin typeface="Open Sans"/>
                           <a:ea typeface="Open Sans"/>
                           <a:cs typeface="Open Sans"/>
                           <a:sym typeface="Open Sans"/>
                         </a:rPr>
-                        <a:t>GeForce GT 1030 2GD4 LP OC</a:t>
+                        <a:t>GEFORCE GT 1030 2GD4 LP OC</a:t>
                       </a:r>
-                      <a:endParaRPr dirty="0">
-                        <a:latin typeface="Open Sans"/>
-                        <a:ea typeface="Open Sans"/>
-                        <a:cs typeface="Open Sans"/>
-                        <a:sym typeface="Open Sans"/>
-                      </a:endParaRPr>
                     </a:p>
                   </a:txBody>
                   <a:tcPr marL="91425" marR="91425" marT="91425" marB="91425">
@@ -7471,7 +7647,7 @@
               <a:buNone/>
             </a:pPr>
             <a:r>
-              <a:rPr lang="es" sz="3000" b="1">
+              <a:rPr lang="es" sz="3000" b="1" dirty="0">
                 <a:solidFill>
                   <a:srgbClr val="EC183F"/>
                 </a:solidFill>
@@ -7480,9 +7656,9 @@
                 <a:cs typeface="Rajdhani"/>
                 <a:sym typeface="Rajdhani"/>
               </a:rPr>
-              <a:t>Gama media - AMD</a:t>
+              <a:t>Gama media</a:t>
             </a:r>
-            <a:endParaRPr sz="3000" b="1">
+            <a:endParaRPr sz="3000" b="1" dirty="0">
               <a:solidFill>
                 <a:srgbClr val="EC183F"/>
               </a:solidFill>
@@ -7588,7 +7764,7 @@
           <p:nvPr>
             <p:extLst>
               <p:ext uri="{D42A27DB-BD31-4B8C-83A1-F6EECF244321}">
-                <p14:modId xmlns:p14="http://schemas.microsoft.com/office/powerpoint/2010/main" val="4285601552"/>
+                <p14:modId xmlns:p14="http://schemas.microsoft.com/office/powerpoint/2010/main" val="325430220"/>
               </p:ext>
             </p:extLst>
           </p:nvPr>
@@ -7679,14 +7855,8 @@
                           <a:cs typeface="Open Sans"/>
                           <a:sym typeface="Open Sans"/>
                         </a:rPr>
-                        <a:t>7th Gen A12-9800 APU</a:t>
+                        <a:t>7TH GEN A12-9800 APU</a:t>
                       </a:r>
-                      <a:endParaRPr dirty="0">
-                        <a:latin typeface="Open Sans"/>
-                        <a:ea typeface="Open Sans"/>
-                        <a:cs typeface="Open Sans"/>
-                        <a:sym typeface="Open Sans"/>
-                      </a:endParaRPr>
                     </a:p>
                   </a:txBody>
                   <a:tcPr marL="91425" marR="91425" marT="91425" marB="91425">
@@ -7750,20 +7920,14 @@
                         <a:buNone/>
                       </a:pPr>
                       <a:r>
-                        <a:rPr lang="es">
+                        <a:rPr lang="es-CO" dirty="0">
                           <a:latin typeface="Open Sans"/>
                           <a:ea typeface="Open Sans"/>
                           <a:cs typeface="Open Sans"/>
                           <a:sym typeface="Open Sans"/>
                         </a:rPr>
-                        <a:t> A320M Asrock</a:t>
+                        <a:t> A320M ASROCK</a:t>
                       </a:r>
-                      <a:endParaRPr dirty="0">
-                        <a:latin typeface="Open Sans"/>
-                        <a:ea typeface="Open Sans"/>
-                        <a:cs typeface="Open Sans"/>
-                        <a:sym typeface="Open Sans"/>
-                      </a:endParaRPr>
                     </a:p>
                   </a:txBody>
                   <a:tcPr marL="91425" marR="91425" marT="91425" marB="91425"/>
@@ -7833,14 +7997,8 @@
                           <a:cs typeface="Open Sans"/>
                           <a:sym typeface="Open Sans"/>
                         </a:rPr>
-                        <a:t>DDR4 16gb 3200 OC</a:t>
+                        <a:t>DDR4 16GB</a:t>
                       </a:r>
-                      <a:endParaRPr dirty="0">
-                        <a:latin typeface="Open Sans"/>
-                        <a:ea typeface="Open Sans"/>
-                        <a:cs typeface="Open Sans"/>
-                        <a:sym typeface="Open Sans"/>
-                      </a:endParaRPr>
                     </a:p>
                   </a:txBody>
                   <a:tcPr marL="91425" marR="91425" marT="91425" marB="91425">
@@ -7986,7 +8144,7 @@
                         </a:rPr>
                         <a:t>RADEON VEGA 3 GRAPHICS</a:t>
                       </a:r>
-                      <a:endParaRPr dirty="0">
+                      <a:endParaRPr lang="es-CO" dirty="0">
                         <a:latin typeface="Open Sans"/>
                         <a:ea typeface="Open Sans"/>
                         <a:cs typeface="Open Sans"/>
@@ -8141,7 +8299,7 @@
           <p:nvPr>
             <p:extLst>
               <p:ext uri="{D42A27DB-BD31-4B8C-83A1-F6EECF244321}">
-                <p14:modId xmlns:p14="http://schemas.microsoft.com/office/powerpoint/2010/main" val="1022082171"/>
+                <p14:modId xmlns:p14="http://schemas.microsoft.com/office/powerpoint/2010/main" val="2160480046"/>
               </p:ext>
             </p:extLst>
           </p:nvPr>
@@ -8231,7 +8389,7 @@
                           <a:ea typeface="Calibri" panose="020F0502020204030204" pitchFamily="34" charset="0"/>
                           <a:cs typeface="Times New Roman" panose="02020603050405020304" pitchFamily="18" charset="0"/>
                         </a:rPr>
-                        <a:t>Intel Core I5 10400F</a:t>
+                        <a:t>INTEL CORE I5 10400F</a:t>
                       </a:r>
                     </a:p>
                   </a:txBody>
@@ -8303,7 +8461,6 @@
                         <a:rPr lang="es-CO" dirty="0"/>
                         <a:t>H410M</a:t>
                       </a:r>
-                      <a:endParaRPr dirty="0"/>
                     </a:p>
                   </a:txBody>
                   <a:tcPr marL="91425" marR="91425" marT="91425" marB="91425">
@@ -8374,7 +8531,6 @@
                         <a:rPr lang="es-CO" dirty="0"/>
                         <a:t>16GB DDR4</a:t>
                       </a:r>
-                      <a:endParaRPr dirty="0"/>
                     </a:p>
                   </a:txBody>
                   <a:tcPr marL="91425" marR="91425" marT="91425" marB="91425">
@@ -8445,7 +8601,6 @@
                         <a:rPr lang="es-CO" dirty="0"/>
                         <a:t>SSD 240GB</a:t>
                       </a:r>
-                      <a:endParaRPr dirty="0"/>
                     </a:p>
                   </a:txBody>
                   <a:tcPr marL="91425" marR="91425" marT="91425" marB="91425">
@@ -8525,7 +8680,7 @@
                         </a:rPr>
                         <a:t>GEFORCE GT 730</a:t>
                       </a:r>
-                      <a:endParaRPr dirty="0"/>
+                      <a:endParaRPr lang="es-CO" dirty="0"/>
                     </a:p>
                   </a:txBody>
                   <a:tcPr marL="91425" marR="91425" marT="91425" marB="91425">
@@ -8544,95 +8699,6 @@
           </a:graphicData>
         </a:graphic>
       </p:graphicFrame>
-      <p:sp>
-        <p:nvSpPr>
-          <p:cNvPr id="203" name="Google Shape;203;p44"/>
-          <p:cNvSpPr txBox="1"/>
-          <p:nvPr/>
-        </p:nvSpPr>
-        <p:spPr>
-          <a:xfrm>
-            <a:off x="636350" y="1534325"/>
-            <a:ext cx="8070600" cy="275400"/>
-          </a:xfrm>
-          <a:prstGeom prst="rect">
-            <a:avLst/>
-          </a:prstGeom>
-          <a:noFill/>
-          <a:ln>
-            <a:noFill/>
-          </a:ln>
-        </p:spPr>
-        <p:txBody>
-          <a:bodyPr spcFirstLastPara="1" wrap="square" lIns="91425" tIns="45700" rIns="91425" bIns="45700" anchor="t" anchorCtr="0">
-            <a:noAutofit/>
-          </a:bodyPr>
-          <a:lstStyle/>
-          <a:p>
-            <a:pPr marL="0" lvl="0" indent="0" algn="l" rtl="0">
-              <a:lnSpc>
-                <a:spcPct val="150000"/>
-              </a:lnSpc>
-              <a:spcBef>
-                <a:spcPts val="0"/>
-              </a:spcBef>
-              <a:spcAft>
-                <a:spcPts val="0"/>
-              </a:spcAft>
-              <a:buClr>
-                <a:schemeClr val="dk1"/>
-              </a:buClr>
-              <a:buSzPts val="1100"/>
-              <a:buFont typeface="Arial"/>
-              <a:buNone/>
-            </a:pPr>
-            <a:r>
-              <a:rPr lang="es" sz="1600" dirty="0">
-                <a:solidFill>
-                  <a:srgbClr val="434343"/>
-                </a:solidFill>
-                <a:latin typeface="Open Sans"/>
-                <a:ea typeface="Open Sans"/>
-                <a:cs typeface="Open Sans"/>
-                <a:sym typeface="Open Sans"/>
-              </a:rPr>
-              <a:t>Esta computadora debe ser armada a libre criterio del estudiante.</a:t>
-            </a:r>
-            <a:endParaRPr sz="1600" dirty="0">
-              <a:solidFill>
-                <a:srgbClr val="434343"/>
-              </a:solidFill>
-              <a:latin typeface="Open Sans"/>
-              <a:ea typeface="Open Sans"/>
-              <a:cs typeface="Open Sans"/>
-              <a:sym typeface="Open Sans"/>
-            </a:endParaRPr>
-          </a:p>
-          <a:p>
-            <a:pPr marL="0" lvl="0" indent="0" algn="l" rtl="0">
-              <a:lnSpc>
-                <a:spcPct val="150000"/>
-              </a:lnSpc>
-              <a:spcBef>
-                <a:spcPts val="0"/>
-              </a:spcBef>
-              <a:spcAft>
-                <a:spcPts val="0"/>
-              </a:spcAft>
-              <a:buNone/>
-            </a:pPr>
-            <a:endParaRPr sz="1600" dirty="0">
-              <a:solidFill>
-                <a:srgbClr val="434343"/>
-              </a:solidFill>
-              <a:latin typeface="Open Sans"/>
-              <a:ea typeface="Open Sans"/>
-              <a:cs typeface="Open Sans"/>
-              <a:sym typeface="Open Sans"/>
-            </a:endParaRPr>
-          </a:p>
-        </p:txBody>
-      </p:sp>
     </p:spTree>
   </p:cSld>
   <p:clrMapOvr>
@@ -8696,7 +8762,7 @@
               <a:buNone/>
             </a:pPr>
             <a:r>
-              <a:rPr lang="es" sz="3000" b="1">
+              <a:rPr lang="es" sz="3000" b="1" dirty="0">
                 <a:solidFill>
                   <a:srgbClr val="EC183F"/>
                 </a:solidFill>
@@ -8705,9 +8771,9 @@
                 <a:cs typeface="Rajdhani"/>
                 <a:sym typeface="Rajdhani"/>
               </a:rPr>
-              <a:t>Gama alta - Intel</a:t>
+              <a:t>Gama alta</a:t>
             </a:r>
-            <a:endParaRPr sz="3000" b="1">
+            <a:endParaRPr sz="3000" b="1" dirty="0">
               <a:solidFill>
                 <a:srgbClr val="EC183F"/>
               </a:solidFill>
@@ -8813,7 +8879,7 @@
           <p:nvPr>
             <p:extLst>
               <p:ext uri="{D42A27DB-BD31-4B8C-83A1-F6EECF244321}">
-                <p14:modId xmlns:p14="http://schemas.microsoft.com/office/powerpoint/2010/main" val="168989912"/>
+                <p14:modId xmlns:p14="http://schemas.microsoft.com/office/powerpoint/2010/main" val="1305734407"/>
               </p:ext>
             </p:extLst>
           </p:nvPr>
@@ -8898,20 +8964,14 @@
                         <a:buNone/>
                       </a:pPr>
                       <a:r>
-                        <a:rPr lang="es">
+                        <a:rPr lang="es-CO" dirty="0">
                           <a:latin typeface="Open Sans"/>
                           <a:ea typeface="Open Sans"/>
                           <a:cs typeface="Open Sans"/>
                           <a:sym typeface="Open Sans"/>
                         </a:rPr>
-                        <a:t>Core i7-10700</a:t>
+                        <a:t>CORE I7-10700</a:t>
                       </a:r>
-                      <a:endParaRPr>
-                        <a:latin typeface="Open Sans"/>
-                        <a:ea typeface="Open Sans"/>
-                        <a:cs typeface="Open Sans"/>
-                        <a:sym typeface="Open Sans"/>
-                      </a:endParaRPr>
                     </a:p>
                   </a:txBody>
                   <a:tcPr marL="91425" marR="91425" marT="91425" marB="91425">
@@ -9059,15 +9119,10 @@
                         <a:buNone/>
                       </a:pPr>
                       <a:r>
-                        <a:rPr lang="es-CO" dirty="0">
-                          <a:latin typeface="Open Sans"/>
-                          <a:ea typeface="Open Sans"/>
-                          <a:cs typeface="Open Sans"/>
-                          <a:sym typeface="Open Sans"/>
-                        </a:rPr>
-                        <a:t>DDR4-2933</a:t>
+                        <a:rPr lang="es-CO" dirty="0"/>
+                        <a:t>32 DDR4</a:t>
                       </a:r>
-                      <a:endParaRPr dirty="0">
+                      <a:endParaRPr lang="es-CO" dirty="0">
                         <a:latin typeface="Open Sans"/>
                         <a:ea typeface="Open Sans"/>
                         <a:cs typeface="Open Sans"/>
@@ -9140,15 +9195,10 @@
                         <a:buNone/>
                       </a:pPr>
                       <a:r>
-                        <a:rPr lang="es-CO" dirty="0">
-                          <a:latin typeface="Open Sans"/>
-                          <a:ea typeface="Open Sans"/>
-                          <a:cs typeface="Open Sans"/>
-                          <a:sym typeface="Open Sans"/>
-                        </a:rPr>
-                        <a:t>GT 710 de 2 GB</a:t>
+                        <a:rPr lang="es-CO" dirty="0"/>
+                        <a:t>SSD 1TB</a:t>
                       </a:r>
-                      <a:endParaRPr dirty="0">
+                      <a:endParaRPr lang="es-CO" dirty="0">
                         <a:latin typeface="Open Sans"/>
                         <a:ea typeface="Open Sans"/>
                         <a:cs typeface="Open Sans"/>
@@ -9221,33 +9271,10 @@
                         <a:buNone/>
                       </a:pPr>
                       <a:r>
-                        <a:rPr lang="es-CO" dirty="0">
-                          <a:latin typeface="Open Sans"/>
-                          <a:ea typeface="Open Sans"/>
-                          <a:cs typeface="Open Sans"/>
-                          <a:sym typeface="Open Sans"/>
-                        </a:rPr>
-                        <a:t>Intel UHD </a:t>
+                        <a:rPr lang="es-CO" dirty="0"/>
+                        <a:t>NVIDIA GEFORCE GT 730</a:t>
                       </a:r>
-                      <a:r>
-                        <a:rPr lang="es-CO" dirty="0" err="1">
-                          <a:latin typeface="Open Sans"/>
-                          <a:ea typeface="Open Sans"/>
-                          <a:cs typeface="Open Sans"/>
-                          <a:sym typeface="Open Sans"/>
-                        </a:rPr>
-                        <a:t>Graphics</a:t>
-                      </a:r>
-                      <a:r>
-                        <a:rPr lang="es-CO" dirty="0">
-                          <a:latin typeface="Open Sans"/>
-                          <a:ea typeface="Open Sans"/>
-                          <a:cs typeface="Open Sans"/>
-                          <a:sym typeface="Open Sans"/>
-                        </a:rPr>
-                        <a:t> 630</a:t>
-                      </a:r>
-                      <a:endParaRPr dirty="0">
+                      <a:endParaRPr lang="es-CO" dirty="0">
                         <a:latin typeface="Open Sans"/>
                         <a:ea typeface="Open Sans"/>
                         <a:cs typeface="Open Sans"/>
@@ -9334,7 +9361,7 @@
               <a:buNone/>
             </a:pPr>
             <a:r>
-              <a:rPr lang="es" sz="3000" b="1">
+              <a:rPr lang="es" sz="3000" b="1" dirty="0">
                 <a:solidFill>
                   <a:srgbClr val="EC183F"/>
                 </a:solidFill>
@@ -9343,9 +9370,9 @@
                 <a:cs typeface="Rajdhani"/>
                 <a:sym typeface="Rajdhani"/>
               </a:rPr>
-              <a:t>Gama alta - AMD</a:t>
+              <a:t>Gama alta</a:t>
             </a:r>
-            <a:endParaRPr sz="3000" b="1">
+            <a:endParaRPr sz="3000" b="1" dirty="0">
               <a:solidFill>
                 <a:srgbClr val="EC183F"/>
               </a:solidFill>
@@ -9402,7 +9429,7 @@
           <p:nvPr>
             <p:extLst>
               <p:ext uri="{D42A27DB-BD31-4B8C-83A1-F6EECF244321}">
-                <p14:modId xmlns:p14="http://schemas.microsoft.com/office/powerpoint/2010/main" val="2558963458"/>
+                <p14:modId xmlns:p14="http://schemas.microsoft.com/office/powerpoint/2010/main" val="3256484740"/>
               </p:ext>
             </p:extLst>
           </p:nvPr>
@@ -9487,20 +9514,14 @@
                         <a:buNone/>
                       </a:pPr>
                       <a:r>
-                        <a:rPr lang="es" dirty="0">
+                        <a:rPr lang="es-CO" dirty="0">
                           <a:latin typeface="Open Sans"/>
                           <a:ea typeface="Open Sans"/>
                           <a:cs typeface="Open Sans"/>
                           <a:sym typeface="Open Sans"/>
                         </a:rPr>
-                        <a:t>Amd Ryzen 7 3800xt</a:t>
+                        <a:t>AMD RYZEN 7 3800XT</a:t>
                       </a:r>
-                      <a:endParaRPr dirty="0">
-                        <a:latin typeface="Open Sans"/>
-                        <a:ea typeface="Open Sans"/>
-                        <a:cs typeface="Open Sans"/>
-                        <a:sym typeface="Open Sans"/>
-                      </a:endParaRPr>
                     </a:p>
                   </a:txBody>
                   <a:tcPr marL="91425" marR="91425" marT="91425" marB="91425">
@@ -9580,7 +9601,7 @@
                         </a:rPr>
                         <a:t>AMD A520M</a:t>
                       </a:r>
-                      <a:endParaRPr dirty="0"/>
+                      <a:endParaRPr lang="es-CO" dirty="0"/>
                     </a:p>
                   </a:txBody>
                   <a:tcPr marL="91425" marR="91425" marT="91425" marB="91425">
@@ -9649,9 +9670,8 @@
                       </a:pPr>
                       <a:r>
                         <a:rPr lang="es-CO" dirty="0"/>
-                        <a:t>DDR4 16GB 3200</a:t>
+                        <a:t>DDR4 64GB</a:t>
                       </a:r>
-                      <a:endParaRPr dirty="0"/>
                     </a:p>
                   </a:txBody>
                   <a:tcPr marL="91425" marR="91425" marT="91425" marB="91425">
@@ -9731,7 +9751,10 @@
                         </a:rPr>
                         <a:t>SSD 512GB </a:t>
                       </a:r>
-                      <a:endParaRPr dirty="0"/>
+                      <a:r>
+                        <a:rPr lang="es-CO" dirty="0"/>
+                        <a:t>+ HDD 2TB</a:t>
+                      </a:r>
                     </a:p>
                   </a:txBody>
                   <a:tcPr marL="91425" marR="91425" marT="91425" marB="91425">
@@ -10004,7 +10027,7 @@
           <p:nvPr>
             <p:extLst>
               <p:ext uri="{D42A27DB-BD31-4B8C-83A1-F6EECF244321}">
-                <p14:modId xmlns:p14="http://schemas.microsoft.com/office/powerpoint/2010/main" val="1153955166"/>
+                <p14:modId xmlns:p14="http://schemas.microsoft.com/office/powerpoint/2010/main" val="670318974"/>
               </p:ext>
             </p:extLst>
           </p:nvPr>
@@ -10095,14 +10118,8 @@
                           <a:cs typeface="Open Sans"/>
                           <a:sym typeface="Open Sans"/>
                         </a:rPr>
-                        <a:t>Intel Core i9 12900k</a:t>
+                        <a:t>INTEL CORE I9 12900K</a:t>
                       </a:r>
-                      <a:endParaRPr dirty="0">
-                        <a:latin typeface="Open Sans"/>
-                        <a:ea typeface="Open Sans"/>
-                        <a:cs typeface="Open Sans"/>
-                        <a:sym typeface="Open Sans"/>
-                      </a:endParaRPr>
                     </a:p>
                   </a:txBody>
                   <a:tcPr marL="91425" marR="91425" marT="91425" marB="91425">
@@ -10250,14 +10267,8 @@
                           <a:cs typeface="Open Sans"/>
                           <a:sym typeface="Open Sans"/>
                         </a:rPr>
-                        <a:t>DDR5-4800</a:t>
+                        <a:t>32GB DDR4</a:t>
                       </a:r>
-                      <a:endParaRPr dirty="0">
-                        <a:latin typeface="Open Sans"/>
-                        <a:ea typeface="Open Sans"/>
-                        <a:cs typeface="Open Sans"/>
-                        <a:sym typeface="Open Sans"/>
-                      </a:endParaRPr>
                     </a:p>
                   </a:txBody>
                   <a:tcPr marL="91425" marR="91425" marT="91425" marB="91425">
@@ -10405,14 +10416,8 @@
                           <a:cs typeface="Open Sans"/>
                           <a:sym typeface="Open Sans"/>
                         </a:rPr>
-                        <a:t>GPU Intel UHD Graphics 770 (Gen12)</a:t>
+                        <a:t>GPU INTEL UHD GRAPHICS 770 (GEN12)</a:t>
                       </a:r>
-                      <a:endParaRPr dirty="0">
-                        <a:latin typeface="Open Sans"/>
-                        <a:ea typeface="Open Sans"/>
-                        <a:cs typeface="Open Sans"/>
-                        <a:sym typeface="Open Sans"/>
-                      </a:endParaRPr>
                     </a:p>
                   </a:txBody>
                   <a:tcPr marL="91425" marR="91425" marT="91425" marB="91425">
@@ -10474,7 +10479,7 @@
               <a:buNone/>
             </a:pPr>
             <a:r>
-              <a:rPr lang="es" sz="1600">
+              <a:rPr lang="es" sz="1600" dirty="0">
                 <a:solidFill>
                   <a:srgbClr val="434343"/>
                 </a:solidFill>
@@ -10485,7 +10490,7 @@
               </a:rPr>
               <a:t>Esta computadora debe ser armada a libre criterio del estudiante.</a:t>
             </a:r>
-            <a:endParaRPr sz="1600">
+            <a:endParaRPr sz="1600" dirty="0">
               <a:solidFill>
                 <a:srgbClr val="434343"/>
               </a:solidFill>
@@ -10508,7 +10513,7 @@
               </a:spcAft>
               <a:buNone/>
             </a:pPr>
-            <a:endParaRPr sz="1600">
+            <a:endParaRPr sz="1600" dirty="0">
               <a:solidFill>
                 <a:srgbClr val="434343"/>
               </a:solidFill>

</xml_diff>